<commit_message>
ML WDS updated version
</commit_message>
<xml_diff>
--- a/MCW-Machine-Learning/Whiteboard design session/WDS trainer presentation - Machine Learning.pptx
+++ b/MCW-Machine-Learning/Whiteboard design session/WDS trainer presentation - Machine Learning.pptx
@@ -6,7 +6,7 @@
     <p:sldMasterId id="2147483665" r:id="rId5"/>
   </p:sldMasterIdLst>
   <p:notesMasterIdLst>
-    <p:notesMasterId r:id="rId37"/>
+    <p:notesMasterId r:id="rId39"/>
   </p:notesMasterIdLst>
   <p:sldIdLst>
     <p:sldId id="300" r:id="rId6"/>
@@ -38,8 +38,10 @@
     <p:sldId id="319" r:id="rId32"/>
     <p:sldId id="338" r:id="rId33"/>
     <p:sldId id="339" r:id="rId34"/>
-    <p:sldId id="318" r:id="rId35"/>
-    <p:sldId id="315" r:id="rId36"/>
+    <p:sldId id="340" r:id="rId35"/>
+    <p:sldId id="341" r:id="rId36"/>
+    <p:sldId id="318" r:id="rId37"/>
+    <p:sldId id="315" r:id="rId38"/>
   </p:sldIdLst>
   <p:sldSz cx="12192000" cy="6858000"/>
   <p:notesSz cx="6858000" cy="9144000"/>
@@ -237,7 +239,7 @@
           <a:p>
             <a:fld id="{52A13B17-C506-4D51-BB37-16B365906619}" type="datetimeFigureOut">
               <a:rPr lang="en-US" smtClean="0"/>
-              <a:t>7/11/2019</a:t>
+              <a:t>11/7/2019</a:t>
             </a:fld>
             <a:endParaRPr lang="en-US" dirty="0"/>
           </a:p>
@@ -2609,7 +2611,7 @@
     </p:spTree>
     <p:extLst>
       <p:ext uri="{BB962C8B-B14F-4D97-AF65-F5344CB8AC3E}">
-        <p14:creationId xmlns:p14="http://schemas.microsoft.com/office/powerpoint/2010/main" val="671285550"/>
+        <p14:creationId xmlns:p14="http://schemas.microsoft.com/office/powerpoint/2010/main" val="3703614781"/>
       </p:ext>
     </p:extLst>
   </p:cSld>
@@ -2646,6 +2648,174 @@
             <p:ph type="sldImg"/>
           </p:nvPr>
         </p:nvSpPr>
+        <p:spPr/>
+      </p:sp>
+      <p:sp>
+        <p:nvSpPr>
+          <p:cNvPr id="3" name="Notes Placeholder 2"/>
+          <p:cNvSpPr>
+            <a:spLocks noGrp="1"/>
+          </p:cNvSpPr>
+          <p:nvPr>
+            <p:ph type="body" idx="1"/>
+          </p:nvPr>
+        </p:nvSpPr>
+        <p:spPr/>
+        <p:txBody>
+          <a:bodyPr/>
+          <a:lstStyle/>
+          <a:p>
+            <a:endParaRPr lang="en-US" dirty="0"/>
+          </a:p>
+        </p:txBody>
+      </p:sp>
+      <p:sp>
+        <p:nvSpPr>
+          <p:cNvPr id="4" name="Slide Number Placeholder 3"/>
+          <p:cNvSpPr>
+            <a:spLocks noGrp="1"/>
+          </p:cNvSpPr>
+          <p:nvPr>
+            <p:ph type="sldNum" sz="quarter" idx="10"/>
+          </p:nvPr>
+        </p:nvSpPr>
+        <p:spPr/>
+        <p:txBody>
+          <a:bodyPr/>
+          <a:lstStyle/>
+          <a:p>
+            <a:fld id="{0998D5BB-B127-481F-BC0A-2F77C576BB34}" type="slidenum">
+              <a:rPr lang="en-US" smtClean="0"/>
+              <a:t>31</a:t>
+            </a:fld>
+            <a:endParaRPr lang="en-US" dirty="0"/>
+          </a:p>
+        </p:txBody>
+      </p:sp>
+    </p:spTree>
+    <p:extLst>
+      <p:ext uri="{BB962C8B-B14F-4D97-AF65-F5344CB8AC3E}">
+        <p14:creationId xmlns:p14="http://schemas.microsoft.com/office/powerpoint/2010/main" val="3425038976"/>
+      </p:ext>
+    </p:extLst>
+  </p:cSld>
+  <p:clrMapOvr>
+    <a:masterClrMapping/>
+  </p:clrMapOvr>
+</p:notes>
+</file>
+
+<file path=ppt/notesSlides/notesSlide32.xml><?xml version="1.0" encoding="utf-8"?>
+<p:notes xmlns:a="http://schemas.openxmlformats.org/drawingml/2006/main" xmlns:r="http://schemas.openxmlformats.org/officeDocument/2006/relationships" xmlns:p="http://schemas.openxmlformats.org/presentationml/2006/main">
+  <p:cSld>
+    <p:spTree>
+      <p:nvGrpSpPr>
+        <p:cNvPr id="1" name=""/>
+        <p:cNvGrpSpPr/>
+        <p:nvPr/>
+      </p:nvGrpSpPr>
+      <p:grpSpPr>
+        <a:xfrm>
+          <a:off x="0" y="0"/>
+          <a:ext cx="0" cy="0"/>
+          <a:chOff x="0" y="0"/>
+          <a:chExt cx="0" cy="0"/>
+        </a:xfrm>
+      </p:grpSpPr>
+      <p:sp>
+        <p:nvSpPr>
+          <p:cNvPr id="2" name="Slide Image Placeholder 1"/>
+          <p:cNvSpPr>
+            <a:spLocks noGrp="1" noRot="1" noChangeAspect="1"/>
+          </p:cNvSpPr>
+          <p:nvPr>
+            <p:ph type="sldImg"/>
+          </p:nvPr>
+        </p:nvSpPr>
+        <p:spPr/>
+      </p:sp>
+      <p:sp>
+        <p:nvSpPr>
+          <p:cNvPr id="3" name="Notes Placeholder 2"/>
+          <p:cNvSpPr>
+            <a:spLocks noGrp="1"/>
+          </p:cNvSpPr>
+          <p:nvPr>
+            <p:ph type="body" idx="1"/>
+          </p:nvPr>
+        </p:nvSpPr>
+        <p:spPr/>
+        <p:txBody>
+          <a:bodyPr/>
+          <a:lstStyle/>
+          <a:p>
+            <a:endParaRPr lang="en-US" dirty="0"/>
+          </a:p>
+        </p:txBody>
+      </p:sp>
+      <p:sp>
+        <p:nvSpPr>
+          <p:cNvPr id="4" name="Slide Number Placeholder 3"/>
+          <p:cNvSpPr>
+            <a:spLocks noGrp="1"/>
+          </p:cNvSpPr>
+          <p:nvPr>
+            <p:ph type="sldNum" sz="quarter" idx="10"/>
+          </p:nvPr>
+        </p:nvSpPr>
+        <p:spPr/>
+        <p:txBody>
+          <a:bodyPr/>
+          <a:lstStyle/>
+          <a:p>
+            <a:fld id="{0998D5BB-B127-481F-BC0A-2F77C576BB34}" type="slidenum">
+              <a:rPr lang="en-US" smtClean="0"/>
+              <a:t>32</a:t>
+            </a:fld>
+            <a:endParaRPr lang="en-US" dirty="0"/>
+          </a:p>
+        </p:txBody>
+      </p:sp>
+    </p:spTree>
+    <p:extLst>
+      <p:ext uri="{BB962C8B-B14F-4D97-AF65-F5344CB8AC3E}">
+        <p14:creationId xmlns:p14="http://schemas.microsoft.com/office/powerpoint/2010/main" val="671285550"/>
+      </p:ext>
+    </p:extLst>
+  </p:cSld>
+  <p:clrMapOvr>
+    <a:masterClrMapping/>
+  </p:clrMapOvr>
+</p:notes>
+</file>
+
+<file path=ppt/notesSlides/notesSlide33.xml><?xml version="1.0" encoding="utf-8"?>
+<p:notes xmlns:a="http://schemas.openxmlformats.org/drawingml/2006/main" xmlns:r="http://schemas.openxmlformats.org/officeDocument/2006/relationships" xmlns:p="http://schemas.openxmlformats.org/presentationml/2006/main">
+  <p:cSld>
+    <p:spTree>
+      <p:nvGrpSpPr>
+        <p:cNvPr id="1" name=""/>
+        <p:cNvGrpSpPr/>
+        <p:nvPr/>
+      </p:nvGrpSpPr>
+      <p:grpSpPr>
+        <a:xfrm>
+          <a:off x="0" y="0"/>
+          <a:ext cx="0" cy="0"/>
+          <a:chOff x="0" y="0"/>
+          <a:chExt cx="0" cy="0"/>
+        </a:xfrm>
+      </p:grpSpPr>
+      <p:sp>
+        <p:nvSpPr>
+          <p:cNvPr id="2" name="Slide Image Placeholder 1"/>
+          <p:cNvSpPr>
+            <a:spLocks noGrp="1" noRot="1" noChangeAspect="1"/>
+          </p:cNvSpPr>
+          <p:nvPr>
+            <p:ph type="sldImg"/>
+          </p:nvPr>
+        </p:nvSpPr>
         <p:spPr>
           <a:xfrm>
             <a:off x="381000" y="685800"/>
@@ -2726,7 +2896,7 @@
                   <a:prstClr val="black"/>
                 </a:solidFill>
               </a:rPr>
-              <a:t>7/11/2019 9:47 PM</a:t>
+              <a:t>11/7/2019 9:49 PM</a:t>
             </a:fld>
             <a:endParaRPr lang="en-US" dirty="0">
               <a:solidFill>
@@ -2758,7 +2928,7 @@
                 </a:solidFill>
               </a:rPr>
               <a:pPr/>
-              <a:t>31</a:t>
+              <a:t>33</a:t>
             </a:fld>
             <a:endParaRPr lang="en-US" dirty="0">
               <a:solidFill>
@@ -19854,6 +20024,397 @@
             <p:ph type="body" sz="quarter" idx="10"/>
           </p:nvPr>
         </p:nvSpPr>
+        <p:spPr>
+          <a:xfrm>
+            <a:off x="269239" y="1189176"/>
+            <a:ext cx="11653523" cy="5258515"/>
+          </a:xfrm>
+        </p:spPr>
+        <p:txBody>
+          <a:bodyPr>
+            <a:noAutofit/>
+          </a:bodyPr>
+          <a:lstStyle/>
+          <a:p>
+            <a:pPr marL="0" indent="0">
+              <a:buNone/>
+            </a:pPr>
+            <a:r>
+              <a:rPr lang="en-US" sz="2000" b="1" i="1" dirty="0">
+                <a:solidFill>
+                  <a:schemeClr val="tx1"/>
+                </a:solidFill>
+              </a:rPr>
+              <a:t>5. We are concerned about the capabilities around securing the solution. We are thinking mostly about security (including networking) and identity. How is Azure Machine Learning supporting enterprise security?</a:t>
+            </a:r>
+          </a:p>
+          <a:p>
+            <a:pPr marL="0" indent="0">
+              <a:buNone/>
+            </a:pPr>
+            <a:endParaRPr lang="en-US" sz="2000" b="1" i="1" dirty="0">
+              <a:solidFill>
+                <a:schemeClr val="tx1"/>
+              </a:solidFill>
+            </a:endParaRPr>
+          </a:p>
+          <a:p>
+            <a:pPr marL="0" indent="0">
+              <a:buNone/>
+            </a:pPr>
+            <a:r>
+              <a:rPr lang="en-US" sz="2000" dirty="0">
+                <a:solidFill>
+                  <a:schemeClr val="tx1"/>
+                </a:solidFill>
+              </a:rPr>
+              <a:t>Azure Machine Learning service has a solid set of features supporting enterprise security including authentication for web service deployment, identity management and authorization, network security (including the use of virtual networks), data encryption, and monitoring. Standard, Azure AD-enabled, user and role management provides support for fine-grained control to Azure Machine Learning service resources. For a detailed overview of enterprise security features, see https://docs.microsoft.com/en-us/azure/machine-learning/service/concept-enterprise-security.</a:t>
+            </a:r>
+          </a:p>
+        </p:txBody>
+      </p:sp>
+      <p:sp>
+        <p:nvSpPr>
+          <p:cNvPr id="2" name="Title 1"/>
+          <p:cNvSpPr>
+            <a:spLocks noGrp="1"/>
+          </p:cNvSpPr>
+          <p:nvPr>
+            <p:ph type="title"/>
+          </p:nvPr>
+        </p:nvSpPr>
+        <p:spPr>
+          <a:xfrm>
+            <a:off x="269240" y="289511"/>
+            <a:ext cx="11655840" cy="800735"/>
+          </a:xfrm>
+        </p:spPr>
+        <p:txBody>
+          <a:bodyPr>
+            <a:normAutofit fontScale="90000"/>
+          </a:bodyPr>
+          <a:lstStyle/>
+          <a:p>
+            <a:r>
+              <a:rPr lang="en-US" sz="4900" dirty="0">
+                <a:solidFill>
+                  <a:schemeClr val="tx1"/>
+                </a:solidFill>
+                <a:cs typeface="Segoe UI" panose="020B0502040204020203" pitchFamily="34" charset="0"/>
+              </a:rPr>
+              <a:t>Preferred objections handling</a:t>
+            </a:r>
+            <a:br>
+              <a:rPr lang="en-US" dirty="0">
+                <a:solidFill>
+                  <a:schemeClr val="tx1"/>
+                </a:solidFill>
+                <a:latin typeface="Segoe UI" panose="020B0502040204020203" pitchFamily="34" charset="0"/>
+              </a:rPr>
+            </a:br>
+            <a:endParaRPr lang="en-US" sz="3236" dirty="0">
+              <a:solidFill>
+                <a:schemeClr val="tx1"/>
+              </a:solidFill>
+              <a:latin typeface="Segoe UI" panose="020B0502040204020203" pitchFamily="34" charset="0"/>
+            </a:endParaRPr>
+          </a:p>
+        </p:txBody>
+      </p:sp>
+    </p:spTree>
+    <p:extLst>
+      <p:ext uri="{BB962C8B-B14F-4D97-AF65-F5344CB8AC3E}">
+        <p14:creationId xmlns:p14="http://schemas.microsoft.com/office/powerpoint/2010/main" val="2598101382"/>
+      </p:ext>
+    </p:extLst>
+  </p:cSld>
+  <p:clrMapOvr>
+    <a:masterClrMapping/>
+  </p:clrMapOvr>
+  <mc:AlternateContent xmlns:mc="http://schemas.openxmlformats.org/markup-compatibility/2006" xmlns:p14="http://schemas.microsoft.com/office/powerpoint/2010/main">
+    <mc:Choice Requires="p14">
+      <p:transition p14:dur="0"/>
+    </mc:Choice>
+    <mc:Fallback xmlns="">
+      <p:transition/>
+    </mc:Fallback>
+  </mc:AlternateContent>
+</p:sld>
+</file>
+
+<file path=ppt/slides/slide31.xml><?xml version="1.0" encoding="utf-8"?>
+<p:sld xmlns:a="http://schemas.openxmlformats.org/drawingml/2006/main" xmlns:r="http://schemas.openxmlformats.org/officeDocument/2006/relationships" xmlns:p="http://schemas.openxmlformats.org/presentationml/2006/main">
+  <p:cSld>
+    <p:spTree>
+      <p:nvGrpSpPr>
+        <p:cNvPr id="1" name=""/>
+        <p:cNvGrpSpPr/>
+        <p:nvPr/>
+      </p:nvGrpSpPr>
+      <p:grpSpPr>
+        <a:xfrm>
+          <a:off x="0" y="0"/>
+          <a:ext cx="0" cy="0"/>
+          <a:chOff x="0" y="0"/>
+          <a:chExt cx="0" cy="0"/>
+        </a:xfrm>
+      </p:grpSpPr>
+      <p:sp>
+        <p:nvSpPr>
+          <p:cNvPr id="3" name="Content Placeholder 2"/>
+          <p:cNvSpPr>
+            <a:spLocks noGrp="1"/>
+          </p:cNvSpPr>
+          <p:nvPr>
+            <p:ph type="body" sz="quarter" idx="10"/>
+          </p:nvPr>
+        </p:nvSpPr>
+        <p:spPr>
+          <a:xfrm>
+            <a:off x="269239" y="1189176"/>
+            <a:ext cx="11653523" cy="5258515"/>
+          </a:xfrm>
+        </p:spPr>
+        <p:txBody>
+          <a:bodyPr>
+            <a:noAutofit/>
+          </a:bodyPr>
+          <a:lstStyle/>
+          <a:p>
+            <a:pPr marL="0" indent="0">
+              <a:buNone/>
+            </a:pPr>
+            <a:r>
+              <a:rPr lang="en-US" sz="2000" b="1" i="1" dirty="0">
+                <a:solidFill>
+                  <a:schemeClr val="tx1"/>
+                </a:solidFill>
+              </a:rPr>
+              <a:t>6. Are we fully aligned with the principles of responsible AI?</a:t>
+            </a:r>
+          </a:p>
+          <a:p>
+            <a:pPr marL="0" indent="0">
+              <a:buNone/>
+            </a:pPr>
+            <a:endParaRPr lang="en-US" sz="2000" b="1" i="1" dirty="0">
+              <a:solidFill>
+                <a:schemeClr val="tx1"/>
+              </a:solidFill>
+            </a:endParaRPr>
+          </a:p>
+          <a:p>
+            <a:pPr marL="0" indent="0">
+              <a:buNone/>
+            </a:pPr>
+            <a:r>
+              <a:rPr lang="en-US" sz="2000" dirty="0">
+                <a:solidFill>
+                  <a:schemeClr val="tx1"/>
+                </a:solidFill>
+              </a:rPr>
+              <a:t>The context and the models developed by Trey Research are fully aligned with the core principles of responsible AI:</a:t>
+            </a:r>
+          </a:p>
+          <a:p>
+            <a:pPr marL="0" indent="0">
+              <a:buNone/>
+            </a:pPr>
+            <a:r>
+              <a:rPr lang="en-US" sz="2000" dirty="0">
+                <a:solidFill>
+                  <a:schemeClr val="tx1"/>
+                </a:solidFill>
+              </a:rPr>
+              <a:t>    - Fairness</a:t>
+            </a:r>
+          </a:p>
+          <a:p>
+            <a:pPr marL="0" indent="0">
+              <a:buNone/>
+            </a:pPr>
+            <a:r>
+              <a:rPr lang="en-US" sz="2000" dirty="0">
+                <a:solidFill>
+                  <a:schemeClr val="tx1"/>
+                </a:solidFill>
+              </a:rPr>
+              <a:t>    - Inclusiveness</a:t>
+            </a:r>
+          </a:p>
+          <a:p>
+            <a:pPr marL="0" indent="0">
+              <a:buNone/>
+            </a:pPr>
+            <a:r>
+              <a:rPr lang="en-US" sz="2000" dirty="0">
+                <a:solidFill>
+                  <a:schemeClr val="tx1"/>
+                </a:solidFill>
+              </a:rPr>
+              <a:t>    - Reliability and safety</a:t>
+            </a:r>
+          </a:p>
+          <a:p>
+            <a:pPr marL="0" indent="0">
+              <a:buNone/>
+            </a:pPr>
+            <a:r>
+              <a:rPr lang="en-US" sz="2000" dirty="0">
+                <a:solidFill>
+                  <a:schemeClr val="tx1"/>
+                </a:solidFill>
+              </a:rPr>
+              <a:t>    - Transparency</a:t>
+            </a:r>
+          </a:p>
+          <a:p>
+            <a:pPr marL="0" indent="0">
+              <a:buNone/>
+            </a:pPr>
+            <a:r>
+              <a:rPr lang="en-US" sz="2000" dirty="0">
+                <a:solidFill>
+                  <a:schemeClr val="tx1"/>
+                </a:solidFill>
+              </a:rPr>
+              <a:t>    - Privacy and security</a:t>
+            </a:r>
+          </a:p>
+          <a:p>
+            <a:pPr marL="0" indent="0">
+              <a:buNone/>
+            </a:pPr>
+            <a:r>
+              <a:rPr lang="en-US" sz="2000" dirty="0">
+                <a:solidFill>
+                  <a:schemeClr val="tx1"/>
+                </a:solidFill>
+              </a:rPr>
+              <a:t>    - Accountability</a:t>
+            </a:r>
+          </a:p>
+          <a:p>
+            <a:pPr marL="0" indent="0">
+              <a:buNone/>
+            </a:pPr>
+            <a:endParaRPr lang="en-US" sz="2000" dirty="0">
+              <a:solidFill>
+                <a:schemeClr val="tx1"/>
+              </a:solidFill>
+            </a:endParaRPr>
+          </a:p>
+          <a:p>
+            <a:pPr marL="0" indent="0">
+              <a:buNone/>
+            </a:pPr>
+            <a:r>
+              <a:rPr lang="en-US" sz="2000" dirty="0">
+                <a:solidFill>
+                  <a:schemeClr val="tx1"/>
+                </a:solidFill>
+              </a:rPr>
+              <a:t>The details about Microsoft's approach to AI are available at https://www.microsoft.com/en-us/ai/our-approach-to-ai.</a:t>
+            </a:r>
+          </a:p>
+        </p:txBody>
+      </p:sp>
+      <p:sp>
+        <p:nvSpPr>
+          <p:cNvPr id="2" name="Title 1"/>
+          <p:cNvSpPr>
+            <a:spLocks noGrp="1"/>
+          </p:cNvSpPr>
+          <p:nvPr>
+            <p:ph type="title"/>
+          </p:nvPr>
+        </p:nvSpPr>
+        <p:spPr>
+          <a:xfrm>
+            <a:off x="269240" y="289511"/>
+            <a:ext cx="11655840" cy="800735"/>
+          </a:xfrm>
+        </p:spPr>
+        <p:txBody>
+          <a:bodyPr>
+            <a:normAutofit fontScale="90000"/>
+          </a:bodyPr>
+          <a:lstStyle/>
+          <a:p>
+            <a:r>
+              <a:rPr lang="en-US" sz="4900" dirty="0">
+                <a:solidFill>
+                  <a:schemeClr val="tx1"/>
+                </a:solidFill>
+                <a:cs typeface="Segoe UI" panose="020B0502040204020203" pitchFamily="34" charset="0"/>
+              </a:rPr>
+              <a:t>Preferred objections handling</a:t>
+            </a:r>
+            <a:br>
+              <a:rPr lang="en-US" dirty="0">
+                <a:solidFill>
+                  <a:schemeClr val="tx1"/>
+                </a:solidFill>
+                <a:latin typeface="Segoe UI" panose="020B0502040204020203" pitchFamily="34" charset="0"/>
+              </a:rPr>
+            </a:br>
+            <a:endParaRPr lang="en-US" sz="3236" dirty="0">
+              <a:solidFill>
+                <a:schemeClr val="tx1"/>
+              </a:solidFill>
+              <a:latin typeface="Segoe UI" panose="020B0502040204020203" pitchFamily="34" charset="0"/>
+            </a:endParaRPr>
+          </a:p>
+        </p:txBody>
+      </p:sp>
+    </p:spTree>
+    <p:extLst>
+      <p:ext uri="{BB962C8B-B14F-4D97-AF65-F5344CB8AC3E}">
+        <p14:creationId xmlns:p14="http://schemas.microsoft.com/office/powerpoint/2010/main" val="2847200121"/>
+      </p:ext>
+    </p:extLst>
+  </p:cSld>
+  <p:clrMapOvr>
+    <a:masterClrMapping/>
+  </p:clrMapOvr>
+  <mc:AlternateContent xmlns:mc="http://schemas.openxmlformats.org/markup-compatibility/2006" xmlns:p14="http://schemas.microsoft.com/office/powerpoint/2010/main">
+    <mc:Choice Requires="p14">
+      <p:transition p14:dur="0"/>
+    </mc:Choice>
+    <mc:Fallback xmlns="">
+      <p:transition/>
+    </mc:Fallback>
+  </mc:AlternateContent>
+</p:sld>
+</file>
+
+<file path=ppt/slides/slide32.xml><?xml version="1.0" encoding="utf-8"?>
+<p:sld xmlns:a="http://schemas.openxmlformats.org/drawingml/2006/main" xmlns:r="http://schemas.openxmlformats.org/officeDocument/2006/relationships" xmlns:p="http://schemas.openxmlformats.org/presentationml/2006/main">
+  <p:cSld>
+    <p:spTree>
+      <p:nvGrpSpPr>
+        <p:cNvPr id="1" name=""/>
+        <p:cNvGrpSpPr/>
+        <p:nvPr/>
+      </p:nvGrpSpPr>
+      <p:grpSpPr>
+        <a:xfrm>
+          <a:off x="0" y="0"/>
+          <a:ext cx="0" cy="0"/>
+          <a:chOff x="0" y="0"/>
+          <a:chExt cx="0" cy="0"/>
+        </a:xfrm>
+      </p:grpSpPr>
+      <p:sp>
+        <p:nvSpPr>
+          <p:cNvPr id="3" name="Content Placeholder 2"/>
+          <p:cNvSpPr>
+            <a:spLocks noGrp="1"/>
+          </p:cNvSpPr>
+          <p:nvPr>
+            <p:ph type="body" sz="quarter" idx="10"/>
+          </p:nvPr>
+        </p:nvSpPr>
         <p:spPr/>
         <p:txBody>
           <a:bodyPr>
@@ -19983,7 +20544,7 @@
 </p:sld>
 </file>
 
-<file path=ppt/slides/slide31.xml><?xml version="1.0" encoding="utf-8"?>
+<file path=ppt/slides/slide33.xml><?xml version="1.0" encoding="utf-8"?>
 <p:sld xmlns:a="http://schemas.openxmlformats.org/drawingml/2006/main" xmlns:r="http://schemas.openxmlformats.org/officeDocument/2006/relationships" xmlns:p="http://schemas.openxmlformats.org/presentationml/2006/main">
   <p:cSld>
     <p:bg>
@@ -20875,7 +21436,7 @@
           <a:lstStyle/>
           <a:p>
             <a:r>
-              <a:rPr lang="en-US" sz="2400" dirty="0">
+              <a:rPr lang="en-US" sz="2000" dirty="0">
                 <a:solidFill>
                   <a:schemeClr val="tx1"/>
                 </a:solidFill>
@@ -20884,7 +21445,7 @@
             </a:r>
           </a:p>
           <a:p>
-            <a:endParaRPr lang="en-US" sz="2400" dirty="0">
+            <a:endParaRPr lang="en-US" sz="2000" dirty="0">
               <a:solidFill>
                 <a:schemeClr val="tx1"/>
               </a:solidFill>
@@ -20892,7 +21453,7 @@
           </a:p>
           <a:p>
             <a:r>
-              <a:rPr lang="en-US" sz="2400" dirty="0">
+              <a:rPr lang="en-US" sz="2000" dirty="0">
                 <a:solidFill>
                   <a:schemeClr val="tx1"/>
                 </a:solidFill>
@@ -20901,7 +21462,7 @@
             </a:r>
           </a:p>
           <a:p>
-            <a:endParaRPr lang="en-US" sz="2400" dirty="0">
+            <a:endParaRPr lang="en-US" sz="2000" dirty="0">
               <a:solidFill>
                 <a:schemeClr val="tx1"/>
               </a:solidFill>
@@ -20909,7 +21470,7 @@
           </a:p>
           <a:p>
             <a:r>
-              <a:rPr lang="en-US" sz="2400" dirty="0">
+              <a:rPr lang="en-US" sz="2000" dirty="0">
                 <a:solidFill>
                   <a:schemeClr val="tx1"/>
                 </a:solidFill>
@@ -20918,7 +21479,7 @@
             </a:r>
           </a:p>
           <a:p>
-            <a:endParaRPr lang="en-US" sz="2400" dirty="0">
+            <a:endParaRPr lang="en-US" sz="2000" dirty="0">
               <a:solidFill>
                 <a:schemeClr val="tx1"/>
               </a:solidFill>
@@ -20926,12 +21487,49 @@
           </a:p>
           <a:p>
             <a:r>
-              <a:rPr lang="en-US" sz="2400" dirty="0">
+              <a:rPr lang="en-US" sz="2000" dirty="0">
                 <a:solidFill>
                   <a:schemeClr val="tx1"/>
                 </a:solidFill>
               </a:rPr>
               <a:t>Some of our team has worked with Azure Databricks, and they are confused by the overlap with Azure Machine Learning service. How should we be thinking about when to use which? </a:t>
+            </a:r>
+          </a:p>
+          <a:p>
+            <a:endParaRPr lang="en-US" sz="2000" dirty="0">
+              <a:solidFill>
+                <a:schemeClr val="tx1"/>
+              </a:solidFill>
+            </a:endParaRPr>
+          </a:p>
+          <a:p>
+            <a:r>
+              <a:rPr lang="en-US" sz="2000" dirty="0">
+                <a:solidFill>
+                  <a:schemeClr val="tx1"/>
+                </a:solidFill>
+              </a:rPr>
+              <a:t>We are concerned about the capabilities around securing the solution. We are thinking mostly about security (including networking) and identity. How is Azure Machine Learning supporting enterprise security?</a:t>
+            </a:r>
+          </a:p>
+          <a:p>
+            <a:r>
+              <a:rPr lang="en-US" sz="2000" dirty="0">
+                <a:solidFill>
+                  <a:schemeClr val="tx1"/>
+                </a:solidFill>
+              </a:rPr>
+              <a:t>   </a:t>
+            </a:r>
+          </a:p>
+          <a:p>
+            <a:r>
+              <a:rPr lang="en-US" sz="2000" dirty="0">
+                <a:solidFill>
+                  <a:schemeClr val="tx1"/>
+                </a:solidFill>
+              </a:rPr>
+              <a:t>Are we fully aligned with the principles of responsible AI?</a:t>
             </a:r>
           </a:p>
         </p:txBody>
@@ -21875,15 +22473,6 @@
 </file>
 
 <file path=customXml/item2.xml><?xml version="1.0" encoding="utf-8"?>
-<p:properties xmlns:p="http://schemas.microsoft.com/office/2006/metadata/properties" xmlns:xsi="http://www.w3.org/2001/XMLSchema-instance" xmlns:pc="http://schemas.microsoft.com/office/infopath/2007/PartnerControls">
-  <documentManagement>
-    <_ip_UnifiedCompliancePolicyUIAction xmlns="http://schemas.microsoft.com/sharepoint/v3" xsi:nil="true"/>
-    <_ip_UnifiedCompliancePolicyProperties xmlns="http://schemas.microsoft.com/sharepoint/v3" xsi:nil="true"/>
-  </documentManagement>
-</p:properties>
-</file>
-
-<file path=customXml/item3.xml><?xml version="1.0" encoding="utf-8"?>
 <ct:contentTypeSchema xmlns:ct="http://schemas.microsoft.com/office/2006/metadata/contentType" xmlns:ma="http://schemas.microsoft.com/office/2006/metadata/properties/metaAttributes" ct:_="" ma:_="" ma:contentTypeName="Document" ma:contentTypeID="0x010100D15DFA3690A15B4081582BBCC6BEAC3E" ma:contentTypeVersion="9" ma:contentTypeDescription="Create a new document." ma:contentTypeScope="" ma:versionID="642da1784587cbe85a7fdbbe4dc36103">
   <xsd:schema xmlns:xsd="http://www.w3.org/2001/XMLSchema" xmlns:xs="http://www.w3.org/2001/XMLSchema" xmlns:p="http://schemas.microsoft.com/office/2006/metadata/properties" xmlns:ns1="http://schemas.microsoft.com/sharepoint/v3" xmlns:ns2="2023ac63-7b75-4916-a9ee-591457758eee" xmlns:ns3="d9c797ad-d7c3-4982-82b7-81352a75e4a5" targetNamespace="http://schemas.microsoft.com/office/2006/metadata/properties" ma:root="true" ma:fieldsID="91198b0246576053cc55dd2c67035a89" ns1:_="" ns2:_="" ns3:_="">
     <xsd:import namespace="http://schemas.microsoft.com/sharepoint/v3"/>
@@ -22085,6 +22674,15 @@
 </ct:contentTypeSchema>
 </file>
 
+<file path=customXml/item3.xml><?xml version="1.0" encoding="utf-8"?>
+<p:properties xmlns:p="http://schemas.microsoft.com/office/2006/metadata/properties" xmlns:xsi="http://www.w3.org/2001/XMLSchema-instance" xmlns:pc="http://schemas.microsoft.com/office/infopath/2007/PartnerControls">
+  <documentManagement>
+    <_ip_UnifiedCompliancePolicyUIAction xmlns="http://schemas.microsoft.com/sharepoint/v3" xsi:nil="true"/>
+    <_ip_UnifiedCompliancePolicyProperties xmlns="http://schemas.microsoft.com/sharepoint/v3" xsi:nil="true"/>
+  </documentManagement>
+</p:properties>
+</file>
+
 <file path=customXml/itemProps1.xml><?xml version="1.0" encoding="utf-8"?>
 <ds:datastoreItem xmlns:ds="http://schemas.openxmlformats.org/officeDocument/2006/customXml" ds:itemID="{F18501AF-04CF-4482-BAE1-607B49DDC378}">
   <ds:schemaRefs>
@@ -22094,24 +22692,6 @@
 </file>
 
 <file path=customXml/itemProps2.xml><?xml version="1.0" encoding="utf-8"?>
-<ds:datastoreItem xmlns:ds="http://schemas.openxmlformats.org/officeDocument/2006/customXml" ds:itemID="{BAF7D529-36AB-45DA-B239-2F912F2D1610}">
-  <ds:schemaRefs>
-    <ds:schemaRef ds:uri="http://purl.org/dc/elements/1.1/"/>
-    <ds:schemaRef ds:uri="http://schemas.microsoft.com/office/2006/metadata/properties"/>
-    <ds:schemaRef ds:uri="http://purl.org/dc/terms/"/>
-    <ds:schemaRef ds:uri="http://schemas.microsoft.com/office/infopath/2007/PartnerControls"/>
-    <ds:schemaRef ds:uri="http://purl.org/dc/dcmitype/"/>
-    <ds:schemaRef ds:uri="http://schemas.openxmlformats.org/package/2006/metadata/core-properties"/>
-    <ds:schemaRef ds:uri="http://schemas.microsoft.com/office/2006/documentManagement/types"/>
-    <ds:schemaRef ds:uri="d9c797ad-d7c3-4982-82b7-81352a75e4a5"/>
-    <ds:schemaRef ds:uri="2023ac63-7b75-4916-a9ee-591457758eee"/>
-    <ds:schemaRef ds:uri="http://schemas.microsoft.com/sharepoint/v3"/>
-    <ds:schemaRef ds:uri="http://www.w3.org/XML/1998/namespace"/>
-  </ds:schemaRefs>
-</ds:datastoreItem>
-</file>
-
-<file path=customXml/itemProps3.xml><?xml version="1.0" encoding="utf-8"?>
 <ds:datastoreItem xmlns:ds="http://schemas.openxmlformats.org/officeDocument/2006/customXml" ds:itemID="{255F5BEB-6AD6-480A-8556-C80C5EBC10F2}">
   <ds:schemaRefs>
     <ds:schemaRef ds:uri="http://schemas.microsoft.com/office/2006/metadata/contentType"/>
@@ -22129,4 +22709,22 @@
     <ds:schemaRef ds:uri="http://schemas.microsoft.com/internal/obd"/>
   </ds:schemaRefs>
 </ds:datastoreItem>
+</file>
+
+<file path=customXml/itemProps3.xml><?xml version="1.0" encoding="utf-8"?>
+<ds:datastoreItem xmlns:ds="http://schemas.openxmlformats.org/officeDocument/2006/customXml" ds:itemID="{BAF7D529-36AB-45DA-B239-2F912F2D1610}">
+  <ds:schemaRefs>
+    <ds:schemaRef ds:uri="http://purl.org/dc/elements/1.1/"/>
+    <ds:schemaRef ds:uri="http://schemas.microsoft.com/office/2006/metadata/properties"/>
+    <ds:schemaRef ds:uri="http://purl.org/dc/terms/"/>
+    <ds:schemaRef ds:uri="http://schemas.microsoft.com/office/infopath/2007/PartnerControls"/>
+    <ds:schemaRef ds:uri="http://purl.org/dc/dcmitype/"/>
+    <ds:schemaRef ds:uri="http://schemas.openxmlformats.org/package/2006/metadata/core-properties"/>
+    <ds:schemaRef ds:uri="http://schemas.microsoft.com/office/2006/documentManagement/types"/>
+    <ds:schemaRef ds:uri="d9c797ad-d7c3-4982-82b7-81352a75e4a5"/>
+    <ds:schemaRef ds:uri="2023ac63-7b75-4916-a9ee-591457758eee"/>
+    <ds:schemaRef ds:uri="http://schemas.microsoft.com/sharepoint/v3"/>
+    <ds:schemaRef ds:uri="http://www.w3.org/XML/1998/namespace"/>
+  </ds:schemaRefs>
+</ds:datastoreItem>
 </file>
</xml_diff>